<commit_message>
changing 3 to 2 lol
</commit_message>
<xml_diff>
--- a/presentation.pptx
+++ b/presentation.pptx
@@ -107,6 +107,11 @@
       </a:defRPr>
     </a:lvl9pPr>
   </p:defaultTextStyle>
+  <p:extLst>
+    <p:ext uri="{EFAFB233-063F-42B5-8137-9DF3F51BA10A}">
+      <p15:sldGuideLst xmlns:p15="http://schemas.microsoft.com/office/powerpoint/2012/main"/>
+    </p:ext>
+  </p:extLst>
 </p:presentation>
 </file>
 
@@ -322,7 +327,7 @@
             <a:fld id="{96DFF08F-DC6B-4601-B491-B0F83F6DD2DA}" type="datetimeFigureOut">
               <a:rPr lang="en-US" dirty="0"/>
               <a:pPr/>
-              <a:t>18-May-18</a:t>
+              <a:t>22-May-18</a:t>
             </a:fld>
             <a:endParaRPr lang="en-US" dirty="0"/>
           </a:p>
@@ -539,7 +544,7 @@
           <a:p>
             <a:fld id="{96DFF08F-DC6B-4601-B491-B0F83F6DD2DA}" type="datetimeFigureOut">
               <a:rPr lang="en-US" dirty="0"/>
-              <a:t>18-May-18</a:t>
+              <a:t>22-May-18</a:t>
             </a:fld>
             <a:endParaRPr lang="en-US" dirty="0"/>
           </a:p>
@@ -714,7 +719,7 @@
           <a:p>
             <a:fld id="{96DFF08F-DC6B-4601-B491-B0F83F6DD2DA}" type="datetimeFigureOut">
               <a:rPr lang="en-US" dirty="0"/>
-              <a:t>18-May-18</a:t>
+              <a:t>22-May-18</a:t>
             </a:fld>
             <a:endParaRPr lang="en-US" dirty="0"/>
           </a:p>
@@ -879,7 +884,7 @@
           <a:p>
             <a:fld id="{96DFF08F-DC6B-4601-B491-B0F83F6DD2DA}" type="datetimeFigureOut">
               <a:rPr lang="en-US" dirty="0"/>
-              <a:t>18-May-18</a:t>
+              <a:t>22-May-18</a:t>
             </a:fld>
             <a:endParaRPr lang="en-US" dirty="0"/>
           </a:p>
@@ -1148,7 +1153,7 @@
           <a:p>
             <a:fld id="{96DFF08F-DC6B-4601-B491-B0F83F6DD2DA}" type="datetimeFigureOut">
               <a:rPr lang="en-US" dirty="0"/>
-              <a:t>18-May-18</a:t>
+              <a:t>22-May-18</a:t>
             </a:fld>
             <a:endParaRPr lang="en-US" dirty="0"/>
           </a:p>
@@ -1466,7 +1471,7 @@
           <a:p>
             <a:fld id="{96DFF08F-DC6B-4601-B491-B0F83F6DD2DA}" type="datetimeFigureOut">
               <a:rPr lang="en-US" dirty="0"/>
-              <a:t>18-May-18</a:t>
+              <a:t>22-May-18</a:t>
             </a:fld>
             <a:endParaRPr lang="en-US" dirty="0"/>
           </a:p>
@@ -1885,7 +1890,7 @@
           <a:p>
             <a:fld id="{96DFF08F-DC6B-4601-B491-B0F83F6DD2DA}" type="datetimeFigureOut">
               <a:rPr lang="en-US" dirty="0"/>
-              <a:t>18-May-18</a:t>
+              <a:t>22-May-18</a:t>
             </a:fld>
             <a:endParaRPr lang="en-US" dirty="0"/>
           </a:p>
@@ -1998,7 +2003,7 @@
           <a:p>
             <a:fld id="{96DFF08F-DC6B-4601-B491-B0F83F6DD2DA}" type="datetimeFigureOut">
               <a:rPr lang="en-US" dirty="0"/>
-              <a:t>18-May-18</a:t>
+              <a:t>22-May-18</a:t>
             </a:fld>
             <a:endParaRPr lang="en-US" dirty="0"/>
           </a:p>
@@ -2088,7 +2093,7 @@
           <a:p>
             <a:fld id="{96DFF08F-DC6B-4601-B491-B0F83F6DD2DA}" type="datetimeFigureOut">
               <a:rPr lang="en-US" dirty="0"/>
-              <a:t>18-May-18</a:t>
+              <a:t>22-May-18</a:t>
             </a:fld>
             <a:endParaRPr lang="en-US" dirty="0"/>
           </a:p>
@@ -2373,7 +2378,7 @@
           <a:p>
             <a:fld id="{96DFF08F-DC6B-4601-B491-B0F83F6DD2DA}" type="datetimeFigureOut">
               <a:rPr lang="en-US" dirty="0"/>
-              <a:t>18-May-18</a:t>
+              <a:t>22-May-18</a:t>
             </a:fld>
             <a:endParaRPr lang="en-US" dirty="0"/>
           </a:p>
@@ -2640,7 +2645,7 @@
           <a:p>
             <a:fld id="{96DFF08F-DC6B-4601-B491-B0F83F6DD2DA}" type="datetimeFigureOut">
               <a:rPr lang="en-US" dirty="0"/>
-              <a:t>18-May-18</a:t>
+              <a:t>22-May-18</a:t>
             </a:fld>
             <a:endParaRPr lang="en-US" dirty="0"/>
           </a:p>
@@ -2890,7 +2895,7 @@
             <a:fld id="{96DFF08F-DC6B-4601-B491-B0F83F6DD2DA}" type="datetimeFigureOut">
               <a:rPr lang="en-US" dirty="0"/>
               <a:pPr/>
-              <a:t>18-May-18</a:t>
+              <a:t>22-May-18</a:t>
             </a:fld>
             <a:endParaRPr lang="en-US" dirty="0"/>
           </a:p>
@@ -3374,7 +3379,28 @@
                 <a:effectLst/>
                 <a:latin typeface="Century Gothic" panose="020B0502020202020204" pitchFamily="34" charset="0"/>
               </a:rPr>
-              <a:t>PDS Assignment 3:</a:t>
+              <a:t>PDS </a:t>
+            </a:r>
+            <a:r>
+              <a:rPr lang="en-US" sz="6000" smtClean="0">
+                <a:effectLst/>
+                <a:latin typeface="Century Gothic" panose="020B0502020202020204" pitchFamily="34" charset="0"/>
+              </a:rPr>
+              <a:t>Assignment </a:t>
+            </a:r>
+            <a:r>
+              <a:rPr lang="en-US" sz="6000" smtClean="0">
+                <a:effectLst/>
+                <a:latin typeface="Century Gothic" panose="020B0502020202020204" pitchFamily="34" charset="0"/>
+              </a:rPr>
+              <a:t>2:</a:t>
+            </a:r>
+            <a:r>
+              <a:rPr lang="en-US" sz="6000" dirty="0" smtClean="0">
+                <a:effectLst/>
+                <a:latin typeface="Century Gothic" panose="020B0502020202020204" pitchFamily="34" charset="0"/>
+              </a:rPr>
+              <a:t/>
             </a:r>
             <a:br>
               <a:rPr lang="en-US" sz="6000" dirty="0" smtClean="0">
@@ -3442,6 +3468,13 @@
   <p:clrMapOvr>
     <a:masterClrMapping/>
   </p:clrMapOvr>
+  <p:timing>
+    <p:tnLst>
+      <p:par>
+        <p:cTn id="1" dur="indefinite" restart="never" nodeType="tmRoot"/>
+      </p:par>
+    </p:tnLst>
+  </p:timing>
 </p:sld>
 </file>
 
@@ -3787,6 +3820,13 @@
   <p:clrMapOvr>
     <a:masterClrMapping/>
   </p:clrMapOvr>
+  <p:timing>
+    <p:tnLst>
+      <p:par>
+        <p:cTn id="1" dur="indefinite" restart="never" nodeType="tmRoot"/>
+      </p:par>
+    </p:tnLst>
+  </p:timing>
 </p:sld>
 </file>
 
@@ -3993,6 +4033,13 @@
   <p:clrMapOvr>
     <a:masterClrMapping/>
   </p:clrMapOvr>
+  <p:timing>
+    <p:tnLst>
+      <p:par>
+        <p:cTn id="1" dur="indefinite" restart="never" nodeType="tmRoot"/>
+      </p:par>
+    </p:tnLst>
+  </p:timing>
 </p:sld>
 </file>
 
@@ -4084,7 +4131,7 @@
                   <a:schemeClr val="tx1"/>
                 </a:solidFill>
               </a:rPr>
-              <a:t> K-Nearest </a:t>
+              <a:t>K-Nearest </a:t>
             </a:r>
             <a:r>
               <a:rPr lang="en-US" b="1" dirty="0" err="1">
@@ -5535,6 +5582,13 @@
   <p:clrMapOvr>
     <a:masterClrMapping/>
   </p:clrMapOvr>
+  <p:timing>
+    <p:tnLst>
+      <p:par>
+        <p:cTn id="1" dur="indefinite" restart="never" nodeType="tmRoot"/>
+      </p:par>
+    </p:tnLst>
+  </p:timing>
 </p:sld>
 </file>
 

</xml_diff>